<commit_message>
Added JUNIT Tests classes
Added AgainstTimeTest class
</commit_message>
<xml_diff>
--- a/glob-2020-samplequestions.pptx
+++ b/glob-2020-samplequestions.pptx
@@ -340,7 +340,7 @@
           <a:p>
             <a:fld id="{7F8DDFDC-2E2E-41E6-A00A-12EACC2C64E1}" type="datetimeFigureOut">
               <a:rPr lang="he-IL" smtClean="0"/>
-              <a:t>א'/סיון/תש"ף</a:t>
+              <a:t>ט"ו/סיון/תש"פ</a:t>
             </a:fld>
             <a:endParaRPr lang="he-IL"/>
           </a:p>
@@ -510,7 +510,7 @@
           <a:p>
             <a:fld id="{7F8DDFDC-2E2E-41E6-A00A-12EACC2C64E1}" type="datetimeFigureOut">
               <a:rPr lang="he-IL" smtClean="0"/>
-              <a:t>א'/סיון/תש"ף</a:t>
+              <a:t>ט"ו/סיון/תש"פ</a:t>
             </a:fld>
             <a:endParaRPr lang="he-IL"/>
           </a:p>
@@ -690,7 +690,7 @@
           <a:p>
             <a:fld id="{7F8DDFDC-2E2E-41E6-A00A-12EACC2C64E1}" type="datetimeFigureOut">
               <a:rPr lang="he-IL" smtClean="0"/>
-              <a:t>א'/סיון/תש"ף</a:t>
+              <a:t>ט"ו/סיון/תש"פ</a:t>
             </a:fld>
             <a:endParaRPr lang="he-IL"/>
           </a:p>
@@ -860,7 +860,7 @@
           <a:p>
             <a:fld id="{7F8DDFDC-2E2E-41E6-A00A-12EACC2C64E1}" type="datetimeFigureOut">
               <a:rPr lang="he-IL" smtClean="0"/>
-              <a:t>א'/סיון/תש"ף</a:t>
+              <a:t>ט"ו/סיון/תש"פ</a:t>
             </a:fld>
             <a:endParaRPr lang="he-IL"/>
           </a:p>
@@ -1106,7 +1106,7 @@
           <a:p>
             <a:fld id="{7F8DDFDC-2E2E-41E6-A00A-12EACC2C64E1}" type="datetimeFigureOut">
               <a:rPr lang="he-IL" smtClean="0"/>
-              <a:t>א'/סיון/תש"ף</a:t>
+              <a:t>ט"ו/סיון/תש"פ</a:t>
             </a:fld>
             <a:endParaRPr lang="he-IL"/>
           </a:p>
@@ -1394,7 +1394,7 @@
           <a:p>
             <a:fld id="{7F8DDFDC-2E2E-41E6-A00A-12EACC2C64E1}" type="datetimeFigureOut">
               <a:rPr lang="he-IL" smtClean="0"/>
-              <a:t>א'/סיון/תש"ף</a:t>
+              <a:t>ט"ו/סיון/תש"פ</a:t>
             </a:fld>
             <a:endParaRPr lang="he-IL"/>
           </a:p>
@@ -1816,7 +1816,7 @@
           <a:p>
             <a:fld id="{7F8DDFDC-2E2E-41E6-A00A-12EACC2C64E1}" type="datetimeFigureOut">
               <a:rPr lang="he-IL" smtClean="0"/>
-              <a:t>א'/סיון/תש"ף</a:t>
+              <a:t>ט"ו/סיון/תש"פ</a:t>
             </a:fld>
             <a:endParaRPr lang="he-IL"/>
           </a:p>
@@ -1934,7 +1934,7 @@
           <a:p>
             <a:fld id="{7F8DDFDC-2E2E-41E6-A00A-12EACC2C64E1}" type="datetimeFigureOut">
               <a:rPr lang="he-IL" smtClean="0"/>
-              <a:t>א'/סיון/תש"ף</a:t>
+              <a:t>ט"ו/סיון/תש"פ</a:t>
             </a:fld>
             <a:endParaRPr lang="he-IL"/>
           </a:p>
@@ -2029,7 +2029,7 @@
           <a:p>
             <a:fld id="{7F8DDFDC-2E2E-41E6-A00A-12EACC2C64E1}" type="datetimeFigureOut">
               <a:rPr lang="he-IL" smtClean="0"/>
-              <a:t>א'/סיון/תש"ף</a:t>
+              <a:t>ט"ו/סיון/תש"פ</a:t>
             </a:fld>
             <a:endParaRPr lang="he-IL"/>
           </a:p>
@@ -2306,7 +2306,7 @@
           <a:p>
             <a:fld id="{7F8DDFDC-2E2E-41E6-A00A-12EACC2C64E1}" type="datetimeFigureOut">
               <a:rPr lang="he-IL" smtClean="0"/>
-              <a:t>א'/סיון/תש"ף</a:t>
+              <a:t>ט"ו/סיון/תש"פ</a:t>
             </a:fld>
             <a:endParaRPr lang="he-IL"/>
           </a:p>
@@ -2559,7 +2559,7 @@
           <a:p>
             <a:fld id="{7F8DDFDC-2E2E-41E6-A00A-12EACC2C64E1}" type="datetimeFigureOut">
               <a:rPr lang="he-IL" smtClean="0"/>
-              <a:t>א'/סיון/תש"ף</a:t>
+              <a:t>ט"ו/סיון/תש"פ</a:t>
             </a:fld>
             <a:endParaRPr lang="he-IL"/>
           </a:p>
@@ -2772,7 +2772,7 @@
           <a:p>
             <a:fld id="{7F8DDFDC-2E2E-41E6-A00A-12EACC2C64E1}" type="datetimeFigureOut">
               <a:rPr lang="he-IL" smtClean="0"/>
-              <a:t>א'/סיון/תש"ף</a:t>
+              <a:t>ט"ו/סיון/תש"פ</a:t>
             </a:fld>
             <a:endParaRPr lang="he-IL"/>
           </a:p>
@@ -3305,7 +3305,15 @@
             </a:pPr>
             <a:r>
               <a:rPr lang="he-IL" sz="2000" dirty="0"/>
-              <a:t>א. ייצור המוני ויעיל הביא לעודפים שניתן היה לייצא ובמחירים יחסית זולים</a:t>
+              <a:t>א. </a:t>
+            </a:r>
+            <a:r>
+              <a:rPr lang="he-IL" sz="2000" dirty="0">
+                <a:highlight>
+                  <a:srgbClr val="FFFF00"/>
+                </a:highlight>
+              </a:rPr>
+              <a:t>ייצור המוני ויעיל הביא לעודפים שניתן היה לייצא ובמחירים יחסית זולים</a:t>
             </a:r>
           </a:p>
           <a:p>
@@ -3323,15 +3331,7 @@
             </a:pPr>
             <a:r>
               <a:rPr lang="he-IL" sz="2000" dirty="0"/>
-              <a:t>ג. </a:t>
-            </a:r>
-            <a:r>
-              <a:rPr lang="he-IL" sz="2000"/>
-              <a:t>מיליונים יכלו להגר </a:t>
-            </a:r>
-            <a:r>
-              <a:rPr lang="he-IL" sz="2000" dirty="0"/>
-              <a:t>מאמריקה ומאפריקה לאירופה הודות לרכבות ולאוניות</a:t>
+              <a:t>ג. מיליונים יכלו להגר מאמריקה ומאפריקה לאירופה הודות לרכבות ולאוניות</a:t>
             </a:r>
           </a:p>
           <a:p>
@@ -3434,7 +3434,15 @@
             </a:pPr>
             <a:r>
               <a:rPr lang="he-IL" sz="2000" dirty="0"/>
-              <a:t>א.הנחת כבל טלגרף טרנס-אטלנטי שאיפשר העברת מידע מהירה בין היבשות</a:t>
+              <a:t>א.</a:t>
+            </a:r>
+            <a:r>
+              <a:rPr lang="he-IL" sz="2000" dirty="0">
+                <a:highlight>
+                  <a:srgbClr val="FFFF00"/>
+                </a:highlight>
+              </a:rPr>
+              <a:t>הנחת כבל טלגרף טרנס-אטלנטי שאיפשר העברת מידע מהירה בין היבשות</a:t>
             </a:r>
           </a:p>
           <a:p>
@@ -3586,7 +3594,15 @@
             </a:pPr>
             <a:r>
               <a:rPr lang="he-IL" sz="2000" dirty="0"/>
-              <a:t>ב. הגירה המונית מן העיר אל הכפר</a:t>
+              <a:t>ב. </a:t>
+            </a:r>
+            <a:r>
+              <a:rPr lang="he-IL" sz="2000" dirty="0">
+                <a:highlight>
+                  <a:srgbClr val="FFFF00"/>
+                </a:highlight>
+              </a:rPr>
+              <a:t>הגירה המונית מן העיר אל הכפר</a:t>
             </a:r>
           </a:p>
           <a:p>
@@ -3725,7 +3741,15 @@
             </a:pPr>
             <a:r>
               <a:rPr lang="he-IL" sz="2000" dirty="0"/>
-              <a:t>ג. ביטול סחר העבדים מאפריקה ליבשת אמריקה</a:t>
+              <a:t>ג</a:t>
+            </a:r>
+            <a:r>
+              <a:rPr lang="he-IL" sz="2000" dirty="0">
+                <a:highlight>
+                  <a:srgbClr val="FFFF00"/>
+                </a:highlight>
+              </a:rPr>
+              <a:t>. ביטול סחר העבדים מאפריקה ליבשת אמריקה</a:t>
             </a:r>
           </a:p>
           <a:p>
@@ -3844,7 +3868,15 @@
             </a:pPr>
             <a:r>
               <a:rPr lang="he-IL" sz="2000" dirty="0"/>
-              <a:t>ב. גלי ההגירה של היהודים לארץ-ישראל היו חלק מתנועות הגירה גלובליות</a:t>
+              <a:t>ב. </a:t>
+            </a:r>
+            <a:r>
+              <a:rPr lang="he-IL" sz="2000" dirty="0">
+                <a:highlight>
+                  <a:srgbClr val="FFFF00"/>
+                </a:highlight>
+              </a:rPr>
+              <a:t>גלי ההגירה של היהודים לארץ-ישראל היו חלק מתנועות הגירה גלובליות</a:t>
             </a:r>
           </a:p>
           <a:p>
@@ -3978,7 +4010,15 @@
             </a:pPr>
             <a:r>
               <a:rPr lang="he-IL" sz="2000" dirty="0"/>
-              <a:t>א. היווצרות חברה רב-תרבותית בה נשמרו קהילות ותרבויות המוצא של המהגרים</a:t>
+              <a:t>א. </a:t>
+            </a:r>
+            <a:r>
+              <a:rPr lang="he-IL" sz="2000" dirty="0">
+                <a:highlight>
+                  <a:srgbClr val="FFFF00"/>
+                </a:highlight>
+              </a:rPr>
+              <a:t>היווצרות חברה רב-תרבותית בה נשמרו קהילות ותרבויות המוצא של המהגרים</a:t>
             </a:r>
           </a:p>
           <a:p>
@@ -4071,7 +4111,7 @@
             <a:pPr algn="r"/>
             <a:r>
               <a:rPr lang="he-IL" sz="2000" dirty="0"/>
-              <a:t>מדוע </a:t>
+              <a:t>מה </a:t>
             </a:r>
             <a:r>
               <a:rPr lang="he-IL" sz="2000" b="1" u="sng" dirty="0"/>
@@ -4143,7 +4183,15 @@
             </a:pPr>
             <a:r>
               <a:rPr lang="he-IL" sz="2000" dirty="0"/>
-              <a:t>ג. המהגרים נחשבו למתורבתים יותר מאשר האמריקאים הוותיקים, ולכן זכו במעמד גבוה</a:t>
+              <a:t>ג. </a:t>
+            </a:r>
+            <a:r>
+              <a:rPr lang="he-IL" sz="2000" dirty="0">
+                <a:highlight>
+                  <a:srgbClr val="FFFF00"/>
+                </a:highlight>
+              </a:rPr>
+              <a:t>המהגרים נחשבו למתורבתים יותר מאשר האמריקאים הוותיקים, ולכן זכו במעמד גבוה</a:t>
             </a:r>
           </a:p>
           <a:p>
@@ -4270,7 +4318,15 @@
             </a:pPr>
             <a:r>
               <a:rPr lang="he-IL" sz="2000" dirty="0"/>
-              <a:t>ג. רצונם של אירופאים להשיג חומרי-גלם שהיו נחוצים לייצור בעידן התעשייתי</a:t>
+              <a:t>ג. </a:t>
+            </a:r>
+            <a:r>
+              <a:rPr lang="he-IL" sz="2000" dirty="0">
+                <a:highlight>
+                  <a:srgbClr val="FFFF00"/>
+                </a:highlight>
+              </a:rPr>
+              <a:t>רצונם של אירופאים להשיג חומרי-גלם שהיו נחוצים לייצור בעידן התעשייתי</a:t>
             </a:r>
           </a:p>
           <a:p>
@@ -4412,7 +4468,15 @@
             </a:pPr>
             <a:r>
               <a:rPr lang="he-IL" sz="2000" dirty="0"/>
-              <a:t>ג. אירופה נעתרה לבקשותיהם של שליטים אפריקאים שרצו לפתח את ארצם על-ידי הבאת מתיישבים אירופאים</a:t>
+              <a:t>ג. </a:t>
+            </a:r>
+            <a:r>
+              <a:rPr lang="he-IL" sz="2000" dirty="0">
+                <a:highlight>
+                  <a:srgbClr val="FFFF00"/>
+                </a:highlight>
+              </a:rPr>
+              <a:t>אירופה נעתרה לבקשותיהם של שליטים אפריקאים שרצו לפתח את ארצם על-ידי הבאת מתיישבים אירופאים</a:t>
             </a:r>
           </a:p>
           <a:p>
@@ -4530,7 +4594,15 @@
             </a:pPr>
             <a:r>
               <a:rPr lang="he-IL" sz="2000" dirty="0"/>
-              <a:t>א. דה-קולוניזציה</a:t>
+              <a:t>א. </a:t>
+            </a:r>
+            <a:r>
+              <a:rPr lang="he-IL" sz="2000" dirty="0">
+                <a:highlight>
+                  <a:srgbClr val="FFFF00"/>
+                </a:highlight>
+              </a:rPr>
+              <a:t>דה-קולוניזציה</a:t>
             </a:r>
           </a:p>
           <a:p>
@@ -4652,7 +4724,15 @@
             </a:pPr>
             <a:r>
               <a:rPr lang="he-IL" sz="2000" dirty="0"/>
-              <a:t>א. המעבר משבטים של ציידים-לקטים לחברה חקלאית מיושבת </a:t>
+              <a:t>א. </a:t>
+            </a:r>
+            <a:r>
+              <a:rPr lang="he-IL" sz="2000" dirty="0">
+                <a:highlight>
+                  <a:srgbClr val="FFFF00"/>
+                </a:highlight>
+              </a:rPr>
+              <a:t>המעבר משבטים של ציידים-לקטים לחברה חקלאית מיושבת </a:t>
             </a:r>
           </a:p>
           <a:p>
@@ -4787,9 +4867,21 @@
             </a:pPr>
             <a:r>
               <a:rPr lang="he-IL" sz="2000" dirty="0"/>
-              <a:t>א. גרם לחוסר-אמון בשיטה הקפיטליסטית ולנסיגה ממדיניות סחר חופשי</a:t>
-            </a:r>
-            <a:endParaRPr lang="en-US" sz="2000" dirty="0"/>
+              <a:t>א. </a:t>
+            </a:r>
+            <a:r>
+              <a:rPr lang="he-IL" sz="2000" dirty="0">
+                <a:highlight>
+                  <a:srgbClr val="FFFF00"/>
+                </a:highlight>
+              </a:rPr>
+              <a:t>גרם לחוסר-אמון בשיטה הקפיטליסטית ולנסיגה ממדיניות סחר חופשי</a:t>
+            </a:r>
+            <a:endParaRPr lang="en-US" sz="2000" dirty="0">
+              <a:highlight>
+                <a:srgbClr val="FFFF00"/>
+              </a:highlight>
+            </a:endParaRPr>
           </a:p>
           <a:p>
             <a:pPr marL="0" indent="0">
@@ -4944,7 +5036,15 @@
             </a:pPr>
             <a:r>
               <a:rPr lang="he-IL" sz="2000" dirty="0"/>
-              <a:t>ג. הקולוניאליזם האירופי גרם לירידה במסחר עם העולם השלישי</a:t>
+              <a:t>ג. </a:t>
+            </a:r>
+            <a:r>
+              <a:rPr lang="he-IL" sz="2000" dirty="0">
+                <a:highlight>
+                  <a:srgbClr val="FFFF00"/>
+                </a:highlight>
+              </a:rPr>
+              <a:t>הקולוניאליזם האירופי גרם לירידה במסחר עם העולם השלישי</a:t>
             </a:r>
           </a:p>
           <a:p>
@@ -5108,7 +5208,15 @@
             </a:pPr>
             <a:r>
               <a:rPr lang="he-IL" sz="2000" dirty="0"/>
-              <a:t>ג. חסמים נגד ייבוא</a:t>
+              <a:t>ג. </a:t>
+            </a:r>
+            <a:r>
+              <a:rPr lang="he-IL" sz="2000" dirty="0">
+                <a:highlight>
+                  <a:srgbClr val="FFFF00"/>
+                </a:highlight>
+              </a:rPr>
+              <a:t>חסמים נגד ייבוא</a:t>
             </a:r>
           </a:p>
           <a:p>
@@ -5212,7 +5320,15 @@
             </a:pPr>
             <a:r>
               <a:rPr lang="he-IL" sz="2000" dirty="0"/>
-              <a:t>א. מדיניות סחר חופשי </a:t>
+              <a:t>א. </a:t>
+            </a:r>
+            <a:r>
+              <a:rPr lang="he-IL" sz="2000" dirty="0">
+                <a:highlight>
+                  <a:srgbClr val="FFFF00"/>
+                </a:highlight>
+              </a:rPr>
+              <a:t>מדיניות סחר חופשי </a:t>
             </a:r>
           </a:p>
           <a:p>
@@ -5351,7 +5467,15 @@
             </a:pPr>
             <a:r>
               <a:rPr lang="he-IL" sz="2000" dirty="0"/>
-              <a:t>ב. הוא עשה את התקשורת והעסקים למהירים, מדויקים וזמינים יותר</a:t>
+              <a:t>ב. </a:t>
+            </a:r>
+            <a:r>
+              <a:rPr lang="he-IL" sz="2000" dirty="0">
+                <a:highlight>
+                  <a:srgbClr val="FFFF00"/>
+                </a:highlight>
+              </a:rPr>
+              <a:t>הוא עשה את התקשורת והעסקים למהירים, מדויקים וזמינים יותר</a:t>
             </a:r>
           </a:p>
           <a:p>
@@ -5492,7 +5616,15 @@
             </a:pPr>
             <a:r>
               <a:rPr lang="he-IL" sz="2000" dirty="0"/>
-              <a:t>ג. גידול עצום בשיעור המשפחות העניות</a:t>
+              <a:t>ג. </a:t>
+            </a:r>
+            <a:r>
+              <a:rPr lang="he-IL" sz="2000" dirty="0">
+                <a:highlight>
+                  <a:srgbClr val="FFFF00"/>
+                </a:highlight>
+              </a:rPr>
+              <a:t>גידול עצום בשיעור המשפחות העניות</a:t>
             </a:r>
           </a:p>
           <a:p>
@@ -5608,7 +5740,15 @@
             </a:pPr>
             <a:r>
               <a:rPr lang="he-IL" sz="2000" dirty="0"/>
-              <a:t>ב. רצון לקיים מסחר ימי עם אפריקה ואסיה</a:t>
+              <a:t>ב. </a:t>
+            </a:r>
+            <a:r>
+              <a:rPr lang="he-IL" sz="2000" dirty="0">
+                <a:highlight>
+                  <a:srgbClr val="FFFF00"/>
+                </a:highlight>
+              </a:rPr>
+              <a:t>רצון לקיים מסחר ימי עם אפריקה ואסיה</a:t>
             </a:r>
           </a:p>
           <a:p>
@@ -5771,7 +5911,15 @@
             </a:pPr>
             <a:r>
               <a:rPr lang="he-IL" sz="2000" dirty="0"/>
-              <a:t>ד. הגירה המונית של איכרים אירופאים ליבשת אפריקה כדי להחליף את העבדים שנלקחו </a:t>
+              <a:t>ד. </a:t>
+            </a:r>
+            <a:r>
+              <a:rPr lang="he-IL" sz="2000" dirty="0">
+                <a:highlight>
+                  <a:srgbClr val="FFFF00"/>
+                </a:highlight>
+              </a:rPr>
+              <a:t>הגירה המונית של איכרים אירופאים ליבשת אפריקה כדי להחליף את העבדים שנלקחו </a:t>
             </a:r>
           </a:p>
         </p:txBody>
@@ -5910,7 +6058,15 @@
             </a:pPr>
             <a:r>
               <a:rPr lang="he-IL" sz="2000" dirty="0"/>
-              <a:t>ד. אפריקאים ואינדיאנים שהצליחו להתעשר צברו גם כוח פוליטי ויכלו להיבחר לשלטון</a:t>
+              <a:t>ד. </a:t>
+            </a:r>
+            <a:r>
+              <a:rPr lang="he-IL" sz="2000" dirty="0">
+                <a:highlight>
+                  <a:srgbClr val="FFFF00"/>
+                </a:highlight>
+              </a:rPr>
+              <a:t>אפריקאים ואינדיאנים שהצליחו להתעשר צברו גם כוח פוליטי ויכלו להיבחר לשלטון</a:t>
             </a:r>
           </a:p>
         </p:txBody>
@@ -6010,9 +6166,21 @@
             </a:pPr>
             <a:r>
               <a:rPr lang="he-IL" sz="2000" dirty="0"/>
-              <a:t>א. מחסור בכוח-עבודה באזורי המטעים ביבשת אמריקה</a:t>
-            </a:r>
-            <a:endParaRPr lang="en-US" sz="2000" dirty="0"/>
+              <a:t>א. </a:t>
+            </a:r>
+            <a:r>
+              <a:rPr lang="he-IL" sz="2000" dirty="0">
+                <a:highlight>
+                  <a:srgbClr val="FFFF00"/>
+                </a:highlight>
+              </a:rPr>
+              <a:t>מחסור בכוח-עבודה באזורי המטעים ביבשת אמריקה</a:t>
+            </a:r>
+            <a:endParaRPr lang="en-US" sz="2000" dirty="0">
+              <a:highlight>
+                <a:srgbClr val="FFFF00"/>
+              </a:highlight>
+            </a:endParaRPr>
           </a:p>
           <a:p>
             <a:pPr marL="0" indent="0">
@@ -6184,9 +6352,21 @@
             </a:pPr>
             <a:r>
               <a:rPr lang="he-IL" sz="2000" dirty="0"/>
-              <a:t>ד. בתקופות של משבר כלכלי באירופה, מצבם היה פחות גרוע כי האדונים דרשו פחות עבודה</a:t>
-            </a:r>
-            <a:endParaRPr lang="en-US" sz="2000" dirty="0"/>
+              <a:t>ד. </a:t>
+            </a:r>
+            <a:r>
+              <a:rPr lang="he-IL" sz="2000" dirty="0">
+                <a:highlight>
+                  <a:srgbClr val="FFFF00"/>
+                </a:highlight>
+              </a:rPr>
+              <a:t>בתקופות של משבר כלכלי באירופה, מצבם היה פחות גרוע כי האדונים דרשו פחות עבודה</a:t>
+            </a:r>
+            <a:endParaRPr lang="en-US" sz="2000" dirty="0">
+              <a:highlight>
+                <a:srgbClr val="FFFF00"/>
+              </a:highlight>
+            </a:endParaRPr>
           </a:p>
           <a:p>
             <a:pPr marL="0" indent="0">
@@ -6322,9 +6502,21 @@
             </a:pPr>
             <a:r>
               <a:rPr lang="he-IL" sz="2000" dirty="0"/>
-              <a:t>ג. יהודים התיישבו במושבות הספרדיות באמריקה כדי לסייע לאינקוויזיציה ברדיפת האנוסים (יהודים שהתנצרו)</a:t>
-            </a:r>
-            <a:endParaRPr lang="en-US" sz="2000" dirty="0"/>
+              <a:t>ג. </a:t>
+            </a:r>
+            <a:r>
+              <a:rPr lang="he-IL" sz="2000" dirty="0">
+                <a:highlight>
+                  <a:srgbClr val="FFFF00"/>
+                </a:highlight>
+              </a:rPr>
+              <a:t>יהודים התיישבו במושבות הספרדיות באמריקה כדי לסייע לאינקוויזיציה ברדיפת האנוסים (יהודים שהתנצרו)</a:t>
+            </a:r>
+            <a:endParaRPr lang="en-US" sz="2000" dirty="0">
+              <a:highlight>
+                <a:srgbClr val="FFFF00"/>
+              </a:highlight>
+            </a:endParaRPr>
           </a:p>
           <a:p>
             <a:pPr marL="0" indent="0">
@@ -6473,7 +6665,15 @@
             </a:pPr>
             <a:r>
               <a:rPr lang="he-IL" sz="2000" dirty="0"/>
-              <a:t>ד.גידול בסחר העבדים מאפריקה לאמריקה</a:t>
+              <a:t>ד.</a:t>
+            </a:r>
+            <a:r>
+              <a:rPr lang="he-IL" sz="2000" dirty="0">
+                <a:highlight>
+                  <a:srgbClr val="FFFF00"/>
+                </a:highlight>
+              </a:rPr>
+              <a:t>גידול בסחר העבדים מאפריקה לאמריקה</a:t>
             </a:r>
           </a:p>
           <a:p>

</xml_diff>